<commit_message>
rework discussion; add conclusions
</commit_message>
<xml_diff>
--- a/figs/mock-ups.pptx
+++ b/figs/mock-ups.pptx
@@ -5,14 +5,15 @@
     <p:sldMasterId id="2147483684" r:id="rId1"/>
   </p:sldMasterIdLst>
   <p:notesMasterIdLst>
-    <p:notesMasterId r:id="rId7"/>
+    <p:notesMasterId r:id="rId8"/>
   </p:notesMasterIdLst>
   <p:sldIdLst>
     <p:sldId id="256" r:id="rId2"/>
     <p:sldId id="257" r:id="rId3"/>
-    <p:sldId id="258" r:id="rId4"/>
-    <p:sldId id="259" r:id="rId5"/>
-    <p:sldId id="260" r:id="rId6"/>
+    <p:sldId id="261" r:id="rId4"/>
+    <p:sldId id="258" r:id="rId5"/>
+    <p:sldId id="259" r:id="rId6"/>
+    <p:sldId id="260" r:id="rId7"/>
   </p:sldIdLst>
   <p:sldSz cx="12192000" cy="13716000"/>
   <p:notesSz cx="6858000" cy="9144000"/>
@@ -638,7 +639,7 @@
           <a:p>
             <a:fld id="{DF15243F-3D71-C541-9B95-649C1658FCF6}" type="slidenum">
               <a:rPr lang="en-US" smtClean="0"/>
-              <a:t>3</a:t>
+              <a:t>4</a:t>
             </a:fld>
             <a:endParaRPr lang="en-US"/>
           </a:p>
@@ -751,7 +752,7 @@
           <a:p>
             <a:fld id="{DF15243F-3D71-C541-9B95-649C1658FCF6}" type="slidenum">
               <a:rPr lang="en-US" smtClean="0"/>
-              <a:t>4</a:t>
+              <a:t>5</a:t>
             </a:fld>
             <a:endParaRPr lang="en-US"/>
           </a:p>
@@ -864,7 +865,7 @@
           <a:p>
             <a:fld id="{DF15243F-3D71-C541-9B95-649C1658FCF6}" type="slidenum">
               <a:rPr lang="en-US" smtClean="0"/>
-              <a:t>5</a:t>
+              <a:t>6</a:t>
             </a:fld>
             <a:endParaRPr lang="en-US"/>
           </a:p>
@@ -4193,6 +4194,953 @@
 </file>
 
 <file path=ppt/slides/slide3.xml><?xml version="1.0" encoding="utf-8"?>
+<p:sld xmlns:a="http://schemas.openxmlformats.org/drawingml/2006/main" xmlns:r="http://schemas.openxmlformats.org/officeDocument/2006/relationships" xmlns:p="http://schemas.openxmlformats.org/presentationml/2006/main">
+  <p:cSld>
+    <p:spTree>
+      <p:nvGrpSpPr>
+        <p:cNvPr id="1" name=""/>
+        <p:cNvGrpSpPr/>
+        <p:nvPr/>
+      </p:nvGrpSpPr>
+      <p:grpSpPr>
+        <a:xfrm>
+          <a:off x="0" y="0"/>
+          <a:ext cx="0" cy="0"/>
+          <a:chOff x="0" y="0"/>
+          <a:chExt cx="0" cy="0"/>
+        </a:xfrm>
+      </p:grpSpPr>
+      <p:grpSp>
+        <p:nvGrpSpPr>
+          <p:cNvPr id="33" name="Group 32">
+            <a:extLst>
+              <a:ext uri="{FF2B5EF4-FFF2-40B4-BE49-F238E27FC236}">
+                <a16:creationId xmlns:a16="http://schemas.microsoft.com/office/drawing/2014/main" id="{175EF776-02F3-C712-4901-8D83A52722C4}"/>
+              </a:ext>
+            </a:extLst>
+          </p:cNvPr>
+          <p:cNvGrpSpPr/>
+          <p:nvPr/>
+        </p:nvGrpSpPr>
+        <p:grpSpPr>
+          <a:xfrm>
+            <a:off x="1075739" y="11887145"/>
+            <a:ext cx="10040522" cy="1403384"/>
+            <a:chOff x="1116272" y="1835846"/>
+            <a:chExt cx="10040522" cy="1403384"/>
+          </a:xfrm>
+        </p:grpSpPr>
+        <p:cxnSp>
+          <p:nvCxnSpPr>
+            <p:cNvPr id="13" name="Straight Connector 12">
+              <a:extLst>
+                <a:ext uri="{FF2B5EF4-FFF2-40B4-BE49-F238E27FC236}">
+                  <a16:creationId xmlns:a16="http://schemas.microsoft.com/office/drawing/2014/main" id="{036AE267-CF8C-D941-9D6D-F45D39721BE2}"/>
+                </a:ext>
+              </a:extLst>
+            </p:cNvPr>
+            <p:cNvCxnSpPr>
+              <a:cxnSpLocks/>
+            </p:cNvCxnSpPr>
+            <p:nvPr/>
+          </p:nvCxnSpPr>
+          <p:spPr>
+            <a:xfrm>
+              <a:off x="1295163" y="2591184"/>
+              <a:ext cx="9861631" cy="0"/>
+            </a:xfrm>
+            <a:prstGeom prst="line">
+              <a:avLst/>
+            </a:prstGeom>
+            <a:ln w="57150">
+              <a:prstDash val="solid"/>
+              <a:headEnd type="triangle" w="med" len="med"/>
+              <a:tailEnd type="triangle" w="med" len="med"/>
+            </a:ln>
+          </p:spPr>
+          <p:style>
+            <a:lnRef idx="1">
+              <a:schemeClr val="dk1"/>
+            </a:lnRef>
+            <a:fillRef idx="0">
+              <a:schemeClr val="dk1"/>
+            </a:fillRef>
+            <a:effectRef idx="0">
+              <a:schemeClr val="dk1"/>
+            </a:effectRef>
+            <a:fontRef idx="minor">
+              <a:schemeClr val="tx1"/>
+            </a:fontRef>
+          </p:style>
+        </p:cxnSp>
+        <p:sp>
+          <p:nvSpPr>
+            <p:cNvPr id="14" name="TextBox 13">
+              <a:extLst>
+                <a:ext uri="{FF2B5EF4-FFF2-40B4-BE49-F238E27FC236}">
+                  <a16:creationId xmlns:a16="http://schemas.microsoft.com/office/drawing/2014/main" id="{926F14B8-6DD0-5762-3BE4-90EBFC1ED90D}"/>
+                </a:ext>
+              </a:extLst>
+            </p:cNvPr>
+            <p:cNvSpPr txBox="1"/>
+            <p:nvPr/>
+          </p:nvSpPr>
+          <p:spPr>
+            <a:xfrm rot="19797029">
+              <a:off x="1116272" y="2839119"/>
+              <a:ext cx="755335" cy="400110"/>
+            </a:xfrm>
+            <a:prstGeom prst="rect">
+              <a:avLst/>
+            </a:prstGeom>
+            <a:noFill/>
+          </p:spPr>
+          <p:txBody>
+            <a:bodyPr wrap="none" rtlCol="0">
+              <a:spAutoFit/>
+            </a:bodyPr>
+            <a:lstStyle/>
+            <a:p>
+              <a:r>
+                <a:rPr lang="en-US" sz="2000" dirty="0">
+                  <a:latin typeface="Helvetica" pitchFamily="2" charset="0"/>
+                </a:rPr>
+                <a:t>1950</a:t>
+              </a:r>
+            </a:p>
+          </p:txBody>
+        </p:sp>
+        <p:sp>
+          <p:nvSpPr>
+            <p:cNvPr id="15" name="TextBox 14">
+              <a:extLst>
+                <a:ext uri="{FF2B5EF4-FFF2-40B4-BE49-F238E27FC236}">
+                  <a16:creationId xmlns:a16="http://schemas.microsoft.com/office/drawing/2014/main" id="{DEE6986F-2717-1C36-D52A-4191A85475A9}"/>
+                </a:ext>
+              </a:extLst>
+            </p:cNvPr>
+            <p:cNvSpPr txBox="1"/>
+            <p:nvPr/>
+          </p:nvSpPr>
+          <p:spPr>
+            <a:xfrm rot="19797029">
+              <a:off x="10262201" y="2839120"/>
+              <a:ext cx="755335" cy="400110"/>
+            </a:xfrm>
+            <a:prstGeom prst="rect">
+              <a:avLst/>
+            </a:prstGeom>
+            <a:noFill/>
+          </p:spPr>
+          <p:txBody>
+            <a:bodyPr wrap="none" rtlCol="0">
+              <a:spAutoFit/>
+            </a:bodyPr>
+            <a:lstStyle/>
+            <a:p>
+              <a:r>
+                <a:rPr lang="en-US" sz="2000" dirty="0">
+                  <a:latin typeface="Helvetica" pitchFamily="2" charset="0"/>
+                </a:rPr>
+                <a:t>2099</a:t>
+              </a:r>
+            </a:p>
+          </p:txBody>
+        </p:sp>
+        <p:sp>
+          <p:nvSpPr>
+            <p:cNvPr id="16" name="TextBox 15">
+              <a:extLst>
+                <a:ext uri="{FF2B5EF4-FFF2-40B4-BE49-F238E27FC236}">
+                  <a16:creationId xmlns:a16="http://schemas.microsoft.com/office/drawing/2014/main" id="{A81A1DB9-097A-700E-5E4D-809E8AB6FD64}"/>
+                </a:ext>
+              </a:extLst>
+            </p:cNvPr>
+            <p:cNvSpPr txBox="1"/>
+            <p:nvPr/>
+          </p:nvSpPr>
+          <p:spPr>
+            <a:xfrm rot="19797029">
+              <a:off x="3044161" y="2824062"/>
+              <a:ext cx="755335" cy="400110"/>
+            </a:xfrm>
+            <a:prstGeom prst="rect">
+              <a:avLst/>
+            </a:prstGeom>
+            <a:noFill/>
+          </p:spPr>
+          <p:txBody>
+            <a:bodyPr wrap="none" rtlCol="0">
+              <a:spAutoFit/>
+            </a:bodyPr>
+            <a:lstStyle/>
+            <a:p>
+              <a:r>
+                <a:rPr lang="en-US" sz="2000" dirty="0">
+                  <a:latin typeface="Helvetica" pitchFamily="2" charset="0"/>
+                </a:rPr>
+                <a:t>1980</a:t>
+              </a:r>
+            </a:p>
+          </p:txBody>
+        </p:sp>
+        <p:sp>
+          <p:nvSpPr>
+            <p:cNvPr id="17" name="TextBox 16">
+              <a:extLst>
+                <a:ext uri="{FF2B5EF4-FFF2-40B4-BE49-F238E27FC236}">
+                  <a16:creationId xmlns:a16="http://schemas.microsoft.com/office/drawing/2014/main" id="{32534208-4175-26D1-FEC2-3E87873420CE}"/>
+                </a:ext>
+              </a:extLst>
+            </p:cNvPr>
+            <p:cNvSpPr txBox="1"/>
+            <p:nvPr/>
+          </p:nvSpPr>
+          <p:spPr>
+            <a:xfrm rot="19797029">
+              <a:off x="4880681" y="2824062"/>
+              <a:ext cx="755335" cy="400110"/>
+            </a:xfrm>
+            <a:prstGeom prst="rect">
+              <a:avLst/>
+            </a:prstGeom>
+            <a:noFill/>
+          </p:spPr>
+          <p:txBody>
+            <a:bodyPr wrap="none" rtlCol="0">
+              <a:spAutoFit/>
+            </a:bodyPr>
+            <a:lstStyle/>
+            <a:p>
+              <a:r>
+                <a:rPr lang="en-US" sz="2000" dirty="0">
+                  <a:latin typeface="Helvetica" pitchFamily="2" charset="0"/>
+                </a:rPr>
+                <a:t>2013</a:t>
+              </a:r>
+            </a:p>
+          </p:txBody>
+        </p:sp>
+        <p:sp>
+          <p:nvSpPr>
+            <p:cNvPr id="18" name="TextBox 17">
+              <a:extLst>
+                <a:ext uri="{FF2B5EF4-FFF2-40B4-BE49-F238E27FC236}">
+                  <a16:creationId xmlns:a16="http://schemas.microsoft.com/office/drawing/2014/main" id="{7937DCC0-51F0-72A6-2225-EA281FC1A252}"/>
+                </a:ext>
+              </a:extLst>
+            </p:cNvPr>
+            <p:cNvSpPr txBox="1"/>
+            <p:nvPr/>
+          </p:nvSpPr>
+          <p:spPr>
+            <a:xfrm rot="19797029">
+              <a:off x="5846788" y="2839119"/>
+              <a:ext cx="755335" cy="400110"/>
+            </a:xfrm>
+            <a:prstGeom prst="rect">
+              <a:avLst/>
+            </a:prstGeom>
+            <a:noFill/>
+          </p:spPr>
+          <p:txBody>
+            <a:bodyPr wrap="none" rtlCol="0">
+              <a:spAutoFit/>
+            </a:bodyPr>
+            <a:lstStyle/>
+            <a:p>
+              <a:r>
+                <a:rPr lang="en-US" sz="2000" dirty="0">
+                  <a:latin typeface="Helvetica" pitchFamily="2" charset="0"/>
+                </a:rPr>
+                <a:t>2025</a:t>
+              </a:r>
+            </a:p>
+          </p:txBody>
+        </p:sp>
+        <p:cxnSp>
+          <p:nvCxnSpPr>
+            <p:cNvPr id="19" name="Straight Connector 18">
+              <a:extLst>
+                <a:ext uri="{FF2B5EF4-FFF2-40B4-BE49-F238E27FC236}">
+                  <a16:creationId xmlns:a16="http://schemas.microsoft.com/office/drawing/2014/main" id="{6A57D01F-22AC-C053-AF27-4A16D8B6EA8A}"/>
+                </a:ext>
+              </a:extLst>
+            </p:cNvPr>
+            <p:cNvCxnSpPr>
+              <a:cxnSpLocks/>
+            </p:cNvCxnSpPr>
+            <p:nvPr/>
+          </p:nvCxnSpPr>
+          <p:spPr>
+            <a:xfrm flipV="1">
+              <a:off x="1809187" y="2568034"/>
+              <a:ext cx="0" cy="182880"/>
+            </a:xfrm>
+            <a:prstGeom prst="line">
+              <a:avLst/>
+            </a:prstGeom>
+            <a:ln w="57150"/>
+          </p:spPr>
+          <p:style>
+            <a:lnRef idx="2">
+              <a:schemeClr val="dk1"/>
+            </a:lnRef>
+            <a:fillRef idx="0">
+              <a:schemeClr val="dk1"/>
+            </a:fillRef>
+            <a:effectRef idx="1">
+              <a:schemeClr val="dk1"/>
+            </a:effectRef>
+            <a:fontRef idx="minor">
+              <a:schemeClr val="tx1"/>
+            </a:fontRef>
+          </p:style>
+        </p:cxnSp>
+        <p:cxnSp>
+          <p:nvCxnSpPr>
+            <p:cNvPr id="20" name="Straight Connector 19">
+              <a:extLst>
+                <a:ext uri="{FF2B5EF4-FFF2-40B4-BE49-F238E27FC236}">
+                  <a16:creationId xmlns:a16="http://schemas.microsoft.com/office/drawing/2014/main" id="{EA90F8E5-E5DF-3776-63AD-F4AE0F8B83BE}"/>
+                </a:ext>
+              </a:extLst>
+            </p:cNvPr>
+            <p:cNvCxnSpPr>
+              <a:cxnSpLocks/>
+            </p:cNvCxnSpPr>
+            <p:nvPr/>
+          </p:nvCxnSpPr>
+          <p:spPr>
+            <a:xfrm flipH="1" flipV="1">
+              <a:off x="3640929" y="2563981"/>
+              <a:ext cx="0" cy="182880"/>
+            </a:xfrm>
+            <a:prstGeom prst="line">
+              <a:avLst/>
+            </a:prstGeom>
+            <a:ln w="57150"/>
+          </p:spPr>
+          <p:style>
+            <a:lnRef idx="2">
+              <a:schemeClr val="dk1"/>
+            </a:lnRef>
+            <a:fillRef idx="0">
+              <a:schemeClr val="dk1"/>
+            </a:fillRef>
+            <a:effectRef idx="1">
+              <a:schemeClr val="dk1"/>
+            </a:effectRef>
+            <a:fontRef idx="minor">
+              <a:schemeClr val="tx1"/>
+            </a:fontRef>
+          </p:style>
+        </p:cxnSp>
+        <p:cxnSp>
+          <p:nvCxnSpPr>
+            <p:cNvPr id="21" name="Straight Connector 20">
+              <a:extLst>
+                <a:ext uri="{FF2B5EF4-FFF2-40B4-BE49-F238E27FC236}">
+                  <a16:creationId xmlns:a16="http://schemas.microsoft.com/office/drawing/2014/main" id="{3EC7BD74-052D-9F65-B942-EA983DFC0791}"/>
+                </a:ext>
+              </a:extLst>
+            </p:cNvPr>
+            <p:cNvCxnSpPr>
+              <a:cxnSpLocks/>
+            </p:cNvCxnSpPr>
+            <p:nvPr/>
+          </p:nvCxnSpPr>
+          <p:spPr>
+            <a:xfrm flipV="1">
+              <a:off x="5469728" y="2572389"/>
+              <a:ext cx="0" cy="182880"/>
+            </a:xfrm>
+            <a:prstGeom prst="line">
+              <a:avLst/>
+            </a:prstGeom>
+            <a:ln w="57150"/>
+          </p:spPr>
+          <p:style>
+            <a:lnRef idx="2">
+              <a:schemeClr val="dk1"/>
+            </a:lnRef>
+            <a:fillRef idx="0">
+              <a:schemeClr val="dk1"/>
+            </a:fillRef>
+            <a:effectRef idx="1">
+              <a:schemeClr val="dk1"/>
+            </a:effectRef>
+            <a:fontRef idx="minor">
+              <a:schemeClr val="tx1"/>
+            </a:fontRef>
+          </p:style>
+        </p:cxnSp>
+        <p:cxnSp>
+          <p:nvCxnSpPr>
+            <p:cNvPr id="22" name="Straight Connector 21">
+              <a:extLst>
+                <a:ext uri="{FF2B5EF4-FFF2-40B4-BE49-F238E27FC236}">
+                  <a16:creationId xmlns:a16="http://schemas.microsoft.com/office/drawing/2014/main" id="{234AFFCF-3F6C-1F92-B43F-01F12DF2AF28}"/>
+                </a:ext>
+              </a:extLst>
+            </p:cNvPr>
+            <p:cNvCxnSpPr>
+              <a:cxnSpLocks/>
+            </p:cNvCxnSpPr>
+            <p:nvPr/>
+          </p:nvCxnSpPr>
+          <p:spPr>
+            <a:xfrm flipV="1">
+              <a:off x="6384130" y="2568034"/>
+              <a:ext cx="0" cy="182880"/>
+            </a:xfrm>
+            <a:prstGeom prst="line">
+              <a:avLst/>
+            </a:prstGeom>
+            <a:ln w="57150"/>
+          </p:spPr>
+          <p:style>
+            <a:lnRef idx="2">
+              <a:schemeClr val="dk1"/>
+            </a:lnRef>
+            <a:fillRef idx="0">
+              <a:schemeClr val="dk1"/>
+            </a:fillRef>
+            <a:effectRef idx="1">
+              <a:schemeClr val="dk1"/>
+            </a:effectRef>
+            <a:fontRef idx="minor">
+              <a:schemeClr val="tx1"/>
+            </a:fontRef>
+          </p:style>
+        </p:cxnSp>
+        <p:cxnSp>
+          <p:nvCxnSpPr>
+            <p:cNvPr id="23" name="Straight Connector 22">
+              <a:extLst>
+                <a:ext uri="{FF2B5EF4-FFF2-40B4-BE49-F238E27FC236}">
+                  <a16:creationId xmlns:a16="http://schemas.microsoft.com/office/drawing/2014/main" id="{C2A8B8FE-F96E-95D1-8DD1-7E2C30F10C9A}"/>
+                </a:ext>
+              </a:extLst>
+            </p:cNvPr>
+            <p:cNvCxnSpPr>
+              <a:cxnSpLocks/>
+            </p:cNvCxnSpPr>
+            <p:nvPr/>
+          </p:nvCxnSpPr>
+          <p:spPr>
+            <a:xfrm flipV="1">
+              <a:off x="10827796" y="2568028"/>
+              <a:ext cx="0" cy="182880"/>
+            </a:xfrm>
+            <a:prstGeom prst="line">
+              <a:avLst/>
+            </a:prstGeom>
+            <a:ln w="57150"/>
+          </p:spPr>
+          <p:style>
+            <a:lnRef idx="2">
+              <a:schemeClr val="dk1"/>
+            </a:lnRef>
+            <a:fillRef idx="0">
+              <a:schemeClr val="dk1"/>
+            </a:fillRef>
+            <a:effectRef idx="1">
+              <a:schemeClr val="dk1"/>
+            </a:effectRef>
+            <a:fontRef idx="minor">
+              <a:schemeClr val="tx1"/>
+            </a:fontRef>
+          </p:style>
+        </p:cxnSp>
+        <p:sp>
+          <p:nvSpPr>
+            <p:cNvPr id="24" name="Rectangle 23">
+              <a:extLst>
+                <a:ext uri="{FF2B5EF4-FFF2-40B4-BE49-F238E27FC236}">
+                  <a16:creationId xmlns:a16="http://schemas.microsoft.com/office/drawing/2014/main" id="{449809DE-6448-FDD6-7630-0304679142E3}"/>
+                </a:ext>
+              </a:extLst>
+            </p:cNvPr>
+            <p:cNvSpPr/>
+            <p:nvPr/>
+          </p:nvSpPr>
+          <p:spPr>
+            <a:xfrm>
+              <a:off x="3628897" y="1837000"/>
+              <a:ext cx="1828799" cy="320040"/>
+            </a:xfrm>
+            <a:prstGeom prst="rect">
+              <a:avLst/>
+            </a:prstGeom>
+            <a:solidFill>
+              <a:srgbClr val="FAC018"/>
+            </a:solidFill>
+            <a:ln w="12700">
+              <a:solidFill>
+                <a:srgbClr val="FAC018"/>
+              </a:solidFill>
+            </a:ln>
+          </p:spPr>
+          <p:style>
+            <a:lnRef idx="2">
+              <a:schemeClr val="accent1">
+                <a:shade val="15000"/>
+              </a:schemeClr>
+            </a:lnRef>
+            <a:fillRef idx="1">
+              <a:schemeClr val="accent1"/>
+            </a:fillRef>
+            <a:effectRef idx="0">
+              <a:schemeClr val="accent1"/>
+            </a:effectRef>
+            <a:fontRef idx="minor">
+              <a:schemeClr val="lt1"/>
+            </a:fontRef>
+          </p:style>
+          <p:txBody>
+            <a:bodyPr rtlCol="0" anchor="ctr"/>
+            <a:lstStyle/>
+            <a:p>
+              <a:pPr algn="ctr"/>
+              <a:r>
+                <a:rPr lang="en-US" sz="1600" b="1" dirty="0">
+                  <a:solidFill>
+                    <a:schemeClr val="tx1"/>
+                  </a:solidFill>
+                  <a:latin typeface="Helvetica" pitchFamily="2" charset="0"/>
+                </a:rPr>
+                <a:t>Historic Climate</a:t>
+              </a:r>
+            </a:p>
+          </p:txBody>
+        </p:sp>
+        <p:sp>
+          <p:nvSpPr>
+            <p:cNvPr id="25" name="Rectangle 24">
+              <a:extLst>
+                <a:ext uri="{FF2B5EF4-FFF2-40B4-BE49-F238E27FC236}">
+                  <a16:creationId xmlns:a16="http://schemas.microsoft.com/office/drawing/2014/main" id="{5EF0DFCB-31EF-5FA9-8AB7-7773FD0B1E98}"/>
+                </a:ext>
+              </a:extLst>
+            </p:cNvPr>
+            <p:cNvSpPr/>
+            <p:nvPr/>
+          </p:nvSpPr>
+          <p:spPr>
+            <a:xfrm>
+              <a:off x="6372085" y="2086192"/>
+              <a:ext cx="4444689" cy="405348"/>
+            </a:xfrm>
+            <a:prstGeom prst="rect">
+              <a:avLst/>
+            </a:prstGeom>
+            <a:solidFill>
+              <a:srgbClr val="1C90FF"/>
+            </a:solidFill>
+            <a:ln w="12700">
+              <a:solidFill>
+                <a:srgbClr val="1C90FF"/>
+              </a:solidFill>
+            </a:ln>
+          </p:spPr>
+          <p:style>
+            <a:lnRef idx="2">
+              <a:schemeClr val="accent1">
+                <a:shade val="15000"/>
+              </a:schemeClr>
+            </a:lnRef>
+            <a:fillRef idx="1">
+              <a:schemeClr val="accent1"/>
+            </a:fillRef>
+            <a:effectRef idx="0">
+              <a:schemeClr val="accent1"/>
+            </a:effectRef>
+            <a:fontRef idx="minor">
+              <a:schemeClr val="lt1"/>
+            </a:fontRef>
+          </p:style>
+          <p:txBody>
+            <a:bodyPr rtlCol="0" anchor="ctr"/>
+            <a:lstStyle/>
+            <a:p>
+              <a:pPr algn="r"/>
+              <a:r>
+                <a:rPr lang="en-US" sz="1600" dirty="0">
+                  <a:latin typeface="Helvetica" pitchFamily="2" charset="0"/>
+                </a:rPr>
+                <a:t>SSP2-4.5		</a:t>
+              </a:r>
+            </a:p>
+          </p:txBody>
+        </p:sp>
+        <p:sp>
+          <p:nvSpPr>
+            <p:cNvPr id="26" name="Rectangle 25">
+              <a:extLst>
+                <a:ext uri="{FF2B5EF4-FFF2-40B4-BE49-F238E27FC236}">
+                  <a16:creationId xmlns:a16="http://schemas.microsoft.com/office/drawing/2014/main" id="{BCC04F60-D8F6-6A2F-91FA-51C591549BFC}"/>
+                </a:ext>
+              </a:extLst>
+            </p:cNvPr>
+            <p:cNvSpPr/>
+            <p:nvPr/>
+          </p:nvSpPr>
+          <p:spPr>
+            <a:xfrm>
+              <a:off x="6372084" y="1835846"/>
+              <a:ext cx="4444690" cy="321194"/>
+            </a:xfrm>
+            <a:prstGeom prst="rect">
+              <a:avLst/>
+            </a:prstGeom>
+            <a:solidFill>
+              <a:srgbClr val="1C90FF"/>
+            </a:solidFill>
+            <a:ln w="12700">
+              <a:solidFill>
+                <a:srgbClr val="1C90FF"/>
+              </a:solidFill>
+            </a:ln>
+          </p:spPr>
+          <p:style>
+            <a:lnRef idx="2">
+              <a:schemeClr val="accent1">
+                <a:shade val="15000"/>
+              </a:schemeClr>
+            </a:lnRef>
+            <a:fillRef idx="1">
+              <a:schemeClr val="accent1"/>
+            </a:fillRef>
+            <a:effectRef idx="0">
+              <a:schemeClr val="accent1"/>
+            </a:effectRef>
+            <a:fontRef idx="minor">
+              <a:schemeClr val="lt1"/>
+            </a:fontRef>
+          </p:style>
+          <p:txBody>
+            <a:bodyPr rtlCol="0" anchor="ctr"/>
+            <a:lstStyle/>
+            <a:p>
+              <a:pPr algn="r"/>
+              <a:r>
+                <a:rPr lang="en-US" sz="1600" dirty="0">
+                  <a:latin typeface="Helvetica" pitchFamily="2" charset="0"/>
+                </a:rPr>
+                <a:t>SSP5-8.5		</a:t>
+              </a:r>
+            </a:p>
+          </p:txBody>
+        </p:sp>
+        <p:sp>
+          <p:nvSpPr>
+            <p:cNvPr id="27" name="TextBox 26">
+              <a:extLst>
+                <a:ext uri="{FF2B5EF4-FFF2-40B4-BE49-F238E27FC236}">
+                  <a16:creationId xmlns:a16="http://schemas.microsoft.com/office/drawing/2014/main" id="{FA9E806E-7064-CF32-7E02-CEACF8E131B1}"/>
+                </a:ext>
+              </a:extLst>
+            </p:cNvPr>
+            <p:cNvSpPr txBox="1"/>
+            <p:nvPr/>
+          </p:nvSpPr>
+          <p:spPr>
+            <a:xfrm>
+              <a:off x="6454279" y="1973528"/>
+              <a:ext cx="1800493" cy="369332"/>
+            </a:xfrm>
+            <a:prstGeom prst="rect">
+              <a:avLst/>
+            </a:prstGeom>
+            <a:noFill/>
+          </p:spPr>
+          <p:txBody>
+            <a:bodyPr wrap="none" rtlCol="0">
+              <a:spAutoFit/>
+            </a:bodyPr>
+            <a:lstStyle/>
+            <a:p>
+              <a:r>
+                <a:rPr lang="en-US" b="1" dirty="0">
+                  <a:latin typeface="Helvetica" pitchFamily="2" charset="0"/>
+                </a:rPr>
+                <a:t>Future Climate</a:t>
+              </a:r>
+            </a:p>
+          </p:txBody>
+        </p:sp>
+        <p:sp>
+          <p:nvSpPr>
+            <p:cNvPr id="28" name="Rectangle 27">
+              <a:extLst>
+                <a:ext uri="{FF2B5EF4-FFF2-40B4-BE49-F238E27FC236}">
+                  <a16:creationId xmlns:a16="http://schemas.microsoft.com/office/drawing/2014/main" id="{6DBB81B1-0B05-9062-5C79-11B5768E2B88}"/>
+                </a:ext>
+              </a:extLst>
+            </p:cNvPr>
+            <p:cNvSpPr/>
+            <p:nvPr/>
+          </p:nvSpPr>
+          <p:spPr>
+            <a:xfrm>
+              <a:off x="5457695" y="2157040"/>
+              <a:ext cx="914386" cy="334500"/>
+            </a:xfrm>
+            <a:prstGeom prst="rect">
+              <a:avLst/>
+            </a:prstGeom>
+            <a:pattFill prst="wdUpDiag">
+              <a:fgClr>
+                <a:srgbClr val="1C90FF"/>
+              </a:fgClr>
+              <a:bgClr>
+                <a:srgbClr val="EF2C2C"/>
+              </a:bgClr>
+            </a:pattFill>
+            <a:ln w="12700">
+              <a:solidFill>
+                <a:srgbClr val="1C90FF"/>
+              </a:solidFill>
+            </a:ln>
+          </p:spPr>
+          <p:style>
+            <a:lnRef idx="2">
+              <a:schemeClr val="accent1">
+                <a:shade val="15000"/>
+              </a:schemeClr>
+            </a:lnRef>
+            <a:fillRef idx="1">
+              <a:schemeClr val="accent1"/>
+            </a:fillRef>
+            <a:effectRef idx="0">
+              <a:schemeClr val="accent1"/>
+            </a:effectRef>
+            <a:fontRef idx="minor">
+              <a:schemeClr val="lt1"/>
+            </a:fontRef>
+          </p:style>
+          <p:txBody>
+            <a:bodyPr rtlCol="0" anchor="ctr"/>
+            <a:lstStyle/>
+            <a:p>
+              <a:pPr algn="ctr"/>
+              <a:endParaRPr lang="en-US">
+                <a:latin typeface="Helvetica" pitchFamily="2" charset="0"/>
+              </a:endParaRPr>
+            </a:p>
+          </p:txBody>
+        </p:sp>
+        <p:sp>
+          <p:nvSpPr>
+            <p:cNvPr id="29" name="Rectangle 28">
+              <a:extLst>
+                <a:ext uri="{FF2B5EF4-FFF2-40B4-BE49-F238E27FC236}">
+                  <a16:creationId xmlns:a16="http://schemas.microsoft.com/office/drawing/2014/main" id="{C185A3D1-323A-A09C-8560-04924B8FF2BE}"/>
+                </a:ext>
+              </a:extLst>
+            </p:cNvPr>
+            <p:cNvSpPr/>
+            <p:nvPr/>
+          </p:nvSpPr>
+          <p:spPr>
+            <a:xfrm>
+              <a:off x="1798169" y="2171500"/>
+              <a:ext cx="3659526" cy="320040"/>
+            </a:xfrm>
+            <a:prstGeom prst="rect">
+              <a:avLst/>
+            </a:prstGeom>
+            <a:solidFill>
+              <a:srgbClr val="EF2C2C"/>
+            </a:solidFill>
+            <a:ln w="12700">
+              <a:solidFill>
+                <a:srgbClr val="EF2C2C"/>
+              </a:solidFill>
+            </a:ln>
+          </p:spPr>
+          <p:style>
+            <a:lnRef idx="2">
+              <a:schemeClr val="accent1">
+                <a:shade val="15000"/>
+              </a:schemeClr>
+            </a:lnRef>
+            <a:fillRef idx="1">
+              <a:schemeClr val="accent1"/>
+            </a:fillRef>
+            <a:effectRef idx="0">
+              <a:schemeClr val="accent1"/>
+            </a:effectRef>
+            <a:fontRef idx="minor">
+              <a:schemeClr val="lt1"/>
+            </a:fontRef>
+          </p:style>
+          <p:txBody>
+            <a:bodyPr rtlCol="0" anchor="ctr"/>
+            <a:lstStyle/>
+            <a:p>
+              <a:pPr algn="ctr"/>
+              <a:r>
+                <a:rPr lang="en-US" sz="1600" b="1" dirty="0">
+                  <a:solidFill>
+                    <a:schemeClr val="bg1"/>
+                  </a:solidFill>
+                  <a:latin typeface="Helvetica" pitchFamily="2" charset="0"/>
+                </a:rPr>
+                <a:t>Streamflow Record</a:t>
+              </a:r>
+            </a:p>
+          </p:txBody>
+        </p:sp>
+        <p:sp>
+          <p:nvSpPr>
+            <p:cNvPr id="30" name="Rectangle 29">
+              <a:extLst>
+                <a:ext uri="{FF2B5EF4-FFF2-40B4-BE49-F238E27FC236}">
+                  <a16:creationId xmlns:a16="http://schemas.microsoft.com/office/drawing/2014/main" id="{213AA2F1-1D2D-8C72-F481-A0C684830174}"/>
+                </a:ext>
+              </a:extLst>
+            </p:cNvPr>
+            <p:cNvSpPr/>
+            <p:nvPr/>
+          </p:nvSpPr>
+          <p:spPr>
+            <a:xfrm>
+              <a:off x="5457694" y="1835846"/>
+              <a:ext cx="914390" cy="321194"/>
+            </a:xfrm>
+            <a:prstGeom prst="rect">
+              <a:avLst/>
+            </a:prstGeom>
+            <a:solidFill>
+              <a:srgbClr val="1C90FF"/>
+            </a:solidFill>
+            <a:ln w="12700">
+              <a:solidFill>
+                <a:srgbClr val="1C90FF"/>
+              </a:solidFill>
+            </a:ln>
+          </p:spPr>
+          <p:style>
+            <a:lnRef idx="2">
+              <a:schemeClr val="accent1">
+                <a:shade val="15000"/>
+              </a:schemeClr>
+            </a:lnRef>
+            <a:fillRef idx="1">
+              <a:schemeClr val="accent1"/>
+            </a:fillRef>
+            <a:effectRef idx="0">
+              <a:schemeClr val="accent1"/>
+            </a:effectRef>
+            <a:fontRef idx="minor">
+              <a:schemeClr val="lt1"/>
+            </a:fontRef>
+          </p:style>
+          <p:txBody>
+            <a:bodyPr rtlCol="0" anchor="ctr"/>
+            <a:lstStyle/>
+            <a:p>
+              <a:pPr algn="r"/>
+              <a:endParaRPr lang="en-US" sz="1600" dirty="0">
+                <a:latin typeface="Helvetica" pitchFamily="2" charset="0"/>
+              </a:endParaRPr>
+            </a:p>
+          </p:txBody>
+        </p:sp>
+      </p:grpSp>
+      <p:pic>
+        <p:nvPicPr>
+          <p:cNvPr id="53" name="Picture 52">
+            <a:extLst>
+              <a:ext uri="{FF2B5EF4-FFF2-40B4-BE49-F238E27FC236}">
+                <a16:creationId xmlns:a16="http://schemas.microsoft.com/office/drawing/2014/main" id="{1CAC13AA-DE16-A1F8-61A0-2EB8424A63B5}"/>
+              </a:ext>
+            </a:extLst>
+          </p:cNvPr>
+          <p:cNvPicPr>
+            <a:picLocks noChangeAspect="1"/>
+          </p:cNvPicPr>
+          <p:nvPr/>
+        </p:nvPicPr>
+        <p:blipFill>
+          <a:blip r:embed="rId2"/>
+          <a:stretch>
+            <a:fillRect/>
+          </a:stretch>
+        </p:blipFill>
+        <p:spPr>
+          <a:xfrm>
+            <a:off x="2399851" y="7043499"/>
+            <a:ext cx="7772400" cy="1287452"/>
+          </a:xfrm>
+          <a:prstGeom prst="rect">
+            <a:avLst/>
+          </a:prstGeom>
+        </p:spPr>
+      </p:pic>
+      <p:pic>
+        <p:nvPicPr>
+          <p:cNvPr id="1026" name="Picture 2">
+            <a:extLst>
+              <a:ext uri="{FF2B5EF4-FFF2-40B4-BE49-F238E27FC236}">
+                <a16:creationId xmlns:a16="http://schemas.microsoft.com/office/drawing/2014/main" id="{C2C4E896-5A1E-EACE-4336-A1E9AA498CFE}"/>
+              </a:ext>
+            </a:extLst>
+          </p:cNvPr>
+          <p:cNvPicPr>
+            <a:picLocks noChangeAspect="1" noChangeArrowheads="1"/>
+          </p:cNvPicPr>
+          <p:nvPr/>
+        </p:nvPicPr>
+        <p:blipFill>
+          <a:blip r:embed="rId3">
+            <a:extLst>
+              <a:ext uri="{28A0092B-C50C-407E-A947-70E740481C1C}">
+                <a14:useLocalDpi xmlns:a14="http://schemas.microsoft.com/office/drawing/2010/main" val="0"/>
+              </a:ext>
+            </a:extLst>
+          </a:blip>
+          <a:srcRect/>
+          <a:stretch>
+            <a:fillRect/>
+          </a:stretch>
+        </p:blipFill>
+        <p:spPr bwMode="auto">
+          <a:xfrm>
+            <a:off x="3556891" y="1138005"/>
+            <a:ext cx="5549314" cy="5539205"/>
+          </a:xfrm>
+          <a:prstGeom prst="rect">
+            <a:avLst/>
+          </a:prstGeom>
+          <a:noFill/>
+          <a:extLst>
+            <a:ext uri="{909E8E84-426E-40DD-AFC4-6F175D3DCCD1}">
+              <a14:hiddenFill xmlns:a14="http://schemas.microsoft.com/office/drawing/2010/main">
+                <a:solidFill>
+                  <a:srgbClr val="FFFFFF"/>
+                </a:solidFill>
+              </a14:hiddenFill>
+            </a:ext>
+          </a:extLst>
+        </p:spPr>
+      </p:pic>
+    </p:spTree>
+    <p:extLst>
+      <p:ext uri="{BB962C8B-B14F-4D97-AF65-F5344CB8AC3E}">
+        <p14:creationId xmlns:p14="http://schemas.microsoft.com/office/powerpoint/2010/main" val="61115518"/>
+      </p:ext>
+    </p:extLst>
+  </p:cSld>
+  <p:clrMapOvr>
+    <a:masterClrMapping/>
+  </p:clrMapOvr>
+</p:sld>
+</file>
+
+<file path=ppt/slides/slide4.xml><?xml version="1.0" encoding="utf-8"?>
 <p:sld xmlns:a="http://schemas.openxmlformats.org/drawingml/2006/main" xmlns:r="http://schemas.openxmlformats.org/officeDocument/2006/relationships" xmlns:p="http://schemas.openxmlformats.org/presentationml/2006/main" show="0">
   <p:cSld>
     <p:spTree>
@@ -8697,7 +9645,7 @@
 </p:sld>
 </file>
 
-<file path=ppt/slides/slide4.xml><?xml version="1.0" encoding="utf-8"?>
+<file path=ppt/slides/slide5.xml><?xml version="1.0" encoding="utf-8"?>
 <p:sld xmlns:a="http://schemas.openxmlformats.org/drawingml/2006/main" xmlns:r="http://schemas.openxmlformats.org/officeDocument/2006/relationships" xmlns:p="http://schemas.openxmlformats.org/presentationml/2006/main" show="0">
   <p:cSld>
     <p:spTree>
@@ -13492,7 +14440,7 @@
 </p:sld>
 </file>
 
-<file path=ppt/slides/slide5.xml><?xml version="1.0" encoding="utf-8"?>
+<file path=ppt/slides/slide6.xml><?xml version="1.0" encoding="utf-8"?>
 <p:sld xmlns:a="http://schemas.openxmlformats.org/drawingml/2006/main" xmlns:r="http://schemas.openxmlformats.org/officeDocument/2006/relationships" xmlns:p="http://schemas.openxmlformats.org/presentationml/2006/main">
   <p:cSld>
     <p:spTree>

</xml_diff>